<commit_message>
fixed Callback, added fernbedienung code, main.cpp erweitert
</commit_message>
<xml_diff>
--- a/SteurelogikPlan.pptx
+++ b/SteurelogikPlan.pptx
@@ -7,6 +7,9 @@
   <p:sldIdLst>
     <p:sldId id="256" r:id="rId2"/>
     <p:sldId id="257" r:id="rId3"/>
+    <p:sldId id="258" r:id="rId4"/>
+    <p:sldId id="259" r:id="rId5"/>
+    <p:sldId id="260" r:id="rId6"/>
   </p:sldIdLst>
   <p:sldSz cx="12192000" cy="6858000"/>
   <p:notesSz cx="6858000" cy="9144000"/>
@@ -260,7 +263,7 @@
           <a:p>
             <a:fld id="{4B66D619-850E-4CD6-9A5A-DAAD9E57CC37}" type="datetimeFigureOut">
               <a:rPr lang="de-DE" smtClean="0"/>
-              <a:t>20.05.2025</a:t>
+              <a:t>27.05.2025</a:t>
             </a:fld>
             <a:endParaRPr lang="de-DE"/>
           </a:p>
@@ -458,7 +461,7 @@
           <a:p>
             <a:fld id="{4B66D619-850E-4CD6-9A5A-DAAD9E57CC37}" type="datetimeFigureOut">
               <a:rPr lang="de-DE" smtClean="0"/>
-              <a:t>20.05.2025</a:t>
+              <a:t>27.05.2025</a:t>
             </a:fld>
             <a:endParaRPr lang="de-DE"/>
           </a:p>
@@ -666,7 +669,7 @@
           <a:p>
             <a:fld id="{4B66D619-850E-4CD6-9A5A-DAAD9E57CC37}" type="datetimeFigureOut">
               <a:rPr lang="de-DE" smtClean="0"/>
-              <a:t>20.05.2025</a:t>
+              <a:t>27.05.2025</a:t>
             </a:fld>
             <a:endParaRPr lang="de-DE"/>
           </a:p>
@@ -864,7 +867,7 @@
           <a:p>
             <a:fld id="{4B66D619-850E-4CD6-9A5A-DAAD9E57CC37}" type="datetimeFigureOut">
               <a:rPr lang="de-DE" smtClean="0"/>
-              <a:t>20.05.2025</a:t>
+              <a:t>27.05.2025</a:t>
             </a:fld>
             <a:endParaRPr lang="de-DE"/>
           </a:p>
@@ -1139,7 +1142,7 @@
           <a:p>
             <a:fld id="{4B66D619-850E-4CD6-9A5A-DAAD9E57CC37}" type="datetimeFigureOut">
               <a:rPr lang="de-DE" smtClean="0"/>
-              <a:t>20.05.2025</a:t>
+              <a:t>27.05.2025</a:t>
             </a:fld>
             <a:endParaRPr lang="de-DE"/>
           </a:p>
@@ -1404,7 +1407,7 @@
           <a:p>
             <a:fld id="{4B66D619-850E-4CD6-9A5A-DAAD9E57CC37}" type="datetimeFigureOut">
               <a:rPr lang="de-DE" smtClean="0"/>
-              <a:t>20.05.2025</a:t>
+              <a:t>27.05.2025</a:t>
             </a:fld>
             <a:endParaRPr lang="de-DE"/>
           </a:p>
@@ -1816,7 +1819,7 @@
           <a:p>
             <a:fld id="{4B66D619-850E-4CD6-9A5A-DAAD9E57CC37}" type="datetimeFigureOut">
               <a:rPr lang="de-DE" smtClean="0"/>
-              <a:t>20.05.2025</a:t>
+              <a:t>27.05.2025</a:t>
             </a:fld>
             <a:endParaRPr lang="de-DE"/>
           </a:p>
@@ -1957,7 +1960,7 @@
           <a:p>
             <a:fld id="{4B66D619-850E-4CD6-9A5A-DAAD9E57CC37}" type="datetimeFigureOut">
               <a:rPr lang="de-DE" smtClean="0"/>
-              <a:t>20.05.2025</a:t>
+              <a:t>27.05.2025</a:t>
             </a:fld>
             <a:endParaRPr lang="de-DE"/>
           </a:p>
@@ -2070,7 +2073,7 @@
           <a:p>
             <a:fld id="{4B66D619-850E-4CD6-9A5A-DAAD9E57CC37}" type="datetimeFigureOut">
               <a:rPr lang="de-DE" smtClean="0"/>
-              <a:t>20.05.2025</a:t>
+              <a:t>27.05.2025</a:t>
             </a:fld>
             <a:endParaRPr lang="de-DE"/>
           </a:p>
@@ -2381,7 +2384,7 @@
           <a:p>
             <a:fld id="{4B66D619-850E-4CD6-9A5A-DAAD9E57CC37}" type="datetimeFigureOut">
               <a:rPr lang="de-DE" smtClean="0"/>
-              <a:t>20.05.2025</a:t>
+              <a:t>27.05.2025</a:t>
             </a:fld>
             <a:endParaRPr lang="de-DE"/>
           </a:p>
@@ -2669,7 +2672,7 @@
           <a:p>
             <a:fld id="{4B66D619-850E-4CD6-9A5A-DAAD9E57CC37}" type="datetimeFigureOut">
               <a:rPr lang="de-DE" smtClean="0"/>
-              <a:t>20.05.2025</a:t>
+              <a:t>27.05.2025</a:t>
             </a:fld>
             <a:endParaRPr lang="de-DE"/>
           </a:p>
@@ -2910,7 +2913,7 @@
           <a:p>
             <a:fld id="{4B66D619-850E-4CD6-9A5A-DAAD9E57CC37}" type="datetimeFigureOut">
               <a:rPr lang="de-DE" smtClean="0"/>
-              <a:t>20.05.2025</a:t>
+              <a:t>27.05.2025</a:t>
             </a:fld>
             <a:endParaRPr lang="de-DE"/>
           </a:p>
@@ -3341,7 +3344,7 @@
         </p:nvSpPr>
         <p:spPr>
           <a:xfrm>
-            <a:off x="2170383" y="1609954"/>
+            <a:off x="2113739" y="1990279"/>
             <a:ext cx="7464056" cy="3327990"/>
           </a:xfrm>
           <a:prstGeom prst="rect">
@@ -3390,7 +3393,7 @@
         </p:nvSpPr>
         <p:spPr>
           <a:xfrm>
-            <a:off x="3787565" y="2130328"/>
+            <a:off x="3730921" y="2510653"/>
             <a:ext cx="1573427" cy="2141837"/>
           </a:xfrm>
           <a:prstGeom prst="rect">
@@ -3442,7 +3445,7 @@
         </p:nvSpPr>
         <p:spPr>
           <a:xfrm>
-            <a:off x="466940" y="3002585"/>
+            <a:off x="410296" y="3382910"/>
             <a:ext cx="1813432" cy="261610"/>
           </a:xfrm>
           <a:prstGeom prst="rect">
@@ -3481,7 +3484,7 @@
         </p:nvSpPr>
         <p:spPr>
           <a:xfrm>
-            <a:off x="626165" y="3201247"/>
+            <a:off x="569521" y="3581572"/>
             <a:ext cx="1544218" cy="125896"/>
           </a:xfrm>
           <a:prstGeom prst="rightArrow">
@@ -3530,7 +3533,7 @@
         </p:nvSpPr>
         <p:spPr>
           <a:xfrm>
-            <a:off x="2304990" y="1753496"/>
+            <a:off x="2248346" y="2133821"/>
             <a:ext cx="2277768" cy="369332"/>
           </a:xfrm>
           <a:prstGeom prst="rect">
@@ -3567,7 +3570,7 @@
         </p:nvCxnSpPr>
         <p:spPr>
           <a:xfrm flipV="1">
-            <a:off x="2170383" y="3264195"/>
+            <a:off x="2113739" y="3644520"/>
             <a:ext cx="1617182" cy="9754"/>
           </a:xfrm>
           <a:prstGeom prst="straightConnector1">
@@ -3606,7 +3609,7 @@
         </p:nvSpPr>
         <p:spPr>
           <a:xfrm>
-            <a:off x="2529772" y="3065533"/>
+            <a:off x="2473128" y="3445858"/>
             <a:ext cx="1118381" cy="261610"/>
           </a:xfrm>
           <a:prstGeom prst="rect">
@@ -3712,7 +3715,7 @@
         </p:nvSpPr>
         <p:spPr>
           <a:xfrm>
-            <a:off x="4824442" y="2252693"/>
+            <a:off x="4767798" y="2633018"/>
             <a:ext cx="609470" cy="1477328"/>
           </a:xfrm>
           <a:prstGeom prst="rect">
@@ -3832,7 +3835,7 @@
         </p:nvSpPr>
         <p:spPr>
           <a:xfrm>
-            <a:off x="6757220" y="2164082"/>
+            <a:off x="6700576" y="2544407"/>
             <a:ext cx="1480991" cy="230832"/>
           </a:xfrm>
           <a:prstGeom prst="rect">
@@ -3867,7 +3870,7 @@
         </p:nvSpPr>
         <p:spPr>
           <a:xfrm>
-            <a:off x="6758088" y="3499189"/>
+            <a:off x="6701444" y="3879514"/>
             <a:ext cx="1151467" cy="230832"/>
           </a:xfrm>
           <a:prstGeom prst="rect">
@@ -3902,7 +3905,7 @@
         </p:nvSpPr>
         <p:spPr>
           <a:xfrm>
-            <a:off x="6758088" y="2782415"/>
+            <a:off x="6701444" y="3162740"/>
             <a:ext cx="1151467" cy="230832"/>
           </a:xfrm>
           <a:prstGeom prst="rect">
@@ -3937,7 +3940,7 @@
         </p:nvSpPr>
         <p:spPr>
           <a:xfrm>
-            <a:off x="6758088" y="3133390"/>
+            <a:off x="6701444" y="3513715"/>
             <a:ext cx="1151467" cy="230832"/>
           </a:xfrm>
           <a:prstGeom prst="rect">
@@ -3972,7 +3975,7 @@
         </p:nvSpPr>
         <p:spPr>
           <a:xfrm>
-            <a:off x="6758088" y="2454985"/>
+            <a:off x="6701444" y="2835310"/>
             <a:ext cx="1151467" cy="230832"/>
           </a:xfrm>
           <a:prstGeom prst="rect">
@@ -4009,7 +4012,7 @@
         </p:nvCxnSpPr>
         <p:spPr>
           <a:xfrm flipV="1">
-            <a:off x="5360992" y="2279498"/>
+            <a:off x="5304348" y="2659823"/>
             <a:ext cx="1396228" cy="111932"/>
           </a:xfrm>
           <a:prstGeom prst="bentConnector3">
@@ -4050,7 +4053,7 @@
         </p:nvCxnSpPr>
         <p:spPr>
           <a:xfrm>
-            <a:off x="5360992" y="2501660"/>
+            <a:off x="5304348" y="2881985"/>
             <a:ext cx="1397096" cy="68741"/>
           </a:xfrm>
           <a:prstGeom prst="bentConnector3">
@@ -4091,7 +4094,7 @@
         </p:nvCxnSpPr>
         <p:spPr>
           <a:xfrm>
-            <a:off x="5360992" y="2628181"/>
+            <a:off x="5304348" y="3008506"/>
             <a:ext cx="1397096" cy="269650"/>
           </a:xfrm>
           <a:prstGeom prst="bentConnector3">
@@ -4132,7 +4135,7 @@
         </p:nvCxnSpPr>
         <p:spPr>
           <a:xfrm>
-            <a:off x="5360992" y="2782415"/>
+            <a:off x="5304348" y="3162740"/>
             <a:ext cx="1397096" cy="466391"/>
           </a:xfrm>
           <a:prstGeom prst="bentConnector3">
@@ -4175,7 +4178,7 @@
         </p:nvCxnSpPr>
         <p:spPr>
           <a:xfrm>
-            <a:off x="5360992" y="2897831"/>
+            <a:off x="5304348" y="3278156"/>
             <a:ext cx="1397096" cy="716774"/>
           </a:xfrm>
           <a:prstGeom prst="bentConnector3">
@@ -4216,7 +4219,7 @@
         </p:nvSpPr>
         <p:spPr>
           <a:xfrm>
-            <a:off x="6758088" y="3852767"/>
+            <a:off x="6701444" y="4233092"/>
             <a:ext cx="1151467" cy="230832"/>
           </a:xfrm>
           <a:prstGeom prst="rect">
@@ -4251,7 +4254,7 @@
         </p:nvSpPr>
         <p:spPr>
           <a:xfrm>
-            <a:off x="6757220" y="4156749"/>
+            <a:off x="6700576" y="4537074"/>
             <a:ext cx="1151467" cy="230832"/>
           </a:xfrm>
           <a:prstGeom prst="rect">
@@ -4288,7 +4291,7 @@
         </p:nvCxnSpPr>
         <p:spPr>
           <a:xfrm>
-            <a:off x="5360992" y="3499189"/>
+            <a:off x="5304348" y="3879514"/>
             <a:ext cx="1397096" cy="468994"/>
           </a:xfrm>
           <a:prstGeom prst="bentConnector3">
@@ -4331,7 +4334,7 @@
         </p:nvCxnSpPr>
         <p:spPr>
           <a:xfrm>
-            <a:off x="5360992" y="3614605"/>
+            <a:off x="5304348" y="3994930"/>
             <a:ext cx="1396228" cy="657560"/>
           </a:xfrm>
           <a:prstGeom prst="bentConnector3">
@@ -4372,7 +4375,7 @@
         </p:nvCxnSpPr>
         <p:spPr>
           <a:xfrm>
-            <a:off x="8005425" y="2279498"/>
+            <a:off x="7948781" y="2659823"/>
             <a:ext cx="1628221" cy="0"/>
           </a:xfrm>
           <a:prstGeom prst="straightConnector1">
@@ -4411,7 +4414,7 @@
         </p:nvCxnSpPr>
         <p:spPr>
           <a:xfrm>
-            <a:off x="7497715" y="2570401"/>
+            <a:off x="7441071" y="2950726"/>
             <a:ext cx="2136724" cy="0"/>
           </a:xfrm>
           <a:prstGeom prst="straightConnector1">
@@ -4450,7 +4453,7 @@
         </p:nvCxnSpPr>
         <p:spPr>
           <a:xfrm>
-            <a:off x="7598369" y="2897831"/>
+            <a:off x="7541725" y="3278156"/>
             <a:ext cx="2035277" cy="0"/>
           </a:xfrm>
           <a:prstGeom prst="straightConnector1">
@@ -4491,7 +4494,7 @@
         </p:nvCxnSpPr>
         <p:spPr>
           <a:xfrm>
-            <a:off x="7580671" y="3256218"/>
+            <a:off x="7524027" y="3636543"/>
             <a:ext cx="2053768" cy="17731"/>
           </a:xfrm>
           <a:prstGeom prst="straightConnector1">
@@ -4530,7 +4533,7 @@
         </p:nvCxnSpPr>
         <p:spPr>
           <a:xfrm>
-            <a:off x="7391892" y="3614605"/>
+            <a:off x="7335248" y="3994930"/>
             <a:ext cx="2241754" cy="0"/>
           </a:xfrm>
           <a:prstGeom prst="straightConnector1">
@@ -4569,7 +4572,7 @@
         </p:nvCxnSpPr>
         <p:spPr>
           <a:xfrm>
-            <a:off x="7704557" y="3968183"/>
+            <a:off x="7647913" y="4348508"/>
             <a:ext cx="1929089" cy="0"/>
           </a:xfrm>
           <a:prstGeom prst="straightConnector1">
@@ -4610,7 +4613,7 @@
         </p:nvCxnSpPr>
         <p:spPr>
           <a:xfrm>
-            <a:off x="7391892" y="4272165"/>
+            <a:off x="7335248" y="4652490"/>
             <a:ext cx="2241754" cy="0"/>
           </a:xfrm>
           <a:prstGeom prst="straightConnector1">
@@ -4649,7 +4652,7 @@
         </p:nvCxnSpPr>
         <p:spPr>
           <a:xfrm>
-            <a:off x="9633646" y="2279498"/>
+            <a:off x="9577002" y="2659823"/>
             <a:ext cx="1244561" cy="0"/>
           </a:xfrm>
           <a:prstGeom prst="straightConnector1">
@@ -4688,7 +4691,7 @@
         </p:nvCxnSpPr>
         <p:spPr>
           <a:xfrm>
-            <a:off x="9633646" y="2570401"/>
+            <a:off x="9577002" y="2950726"/>
             <a:ext cx="1244561" cy="0"/>
           </a:xfrm>
           <a:prstGeom prst="straightConnector1">
@@ -4727,7 +4730,7 @@
         </p:nvCxnSpPr>
         <p:spPr>
           <a:xfrm>
-            <a:off x="9633646" y="2897898"/>
+            <a:off x="9577002" y="3278223"/>
             <a:ext cx="1244561" cy="0"/>
           </a:xfrm>
           <a:prstGeom prst="straightConnector1">
@@ -4766,7 +4769,7 @@
         </p:nvCxnSpPr>
         <p:spPr>
           <a:xfrm>
-            <a:off x="9633646" y="3276463"/>
+            <a:off x="9577002" y="3656788"/>
             <a:ext cx="1244561" cy="0"/>
           </a:xfrm>
           <a:prstGeom prst="straightConnector1">
@@ -4805,7 +4808,7 @@
         </p:nvCxnSpPr>
         <p:spPr>
           <a:xfrm>
-            <a:off x="9633646" y="3614605"/>
+            <a:off x="9577002" y="3994930"/>
             <a:ext cx="1244561" cy="0"/>
           </a:xfrm>
           <a:prstGeom prst="straightConnector1">
@@ -4844,7 +4847,7 @@
         </p:nvCxnSpPr>
         <p:spPr>
           <a:xfrm>
-            <a:off x="9633646" y="3967464"/>
+            <a:off x="9577002" y="4347789"/>
             <a:ext cx="1244561" cy="0"/>
           </a:xfrm>
           <a:prstGeom prst="straightConnector1">
@@ -4883,7 +4886,7 @@
         </p:nvCxnSpPr>
         <p:spPr>
           <a:xfrm>
-            <a:off x="9633646" y="4272165"/>
+            <a:off x="9577002" y="4652490"/>
             <a:ext cx="1244561" cy="0"/>
           </a:xfrm>
           <a:prstGeom prst="straightConnector1">
@@ -5129,7 +5132,7 @@
         </p:nvSpPr>
         <p:spPr>
           <a:xfrm>
-            <a:off x="7994930" y="2716966"/>
+            <a:off x="8670820" y="2720733"/>
             <a:ext cx="1067255" cy="93611"/>
           </a:xfrm>
           <a:prstGeom prst="rightArrow">
@@ -5181,7 +5184,7 @@
         </p:nvSpPr>
         <p:spPr>
           <a:xfrm>
-            <a:off x="9062185" y="2645042"/>
+            <a:off x="9738075" y="2648809"/>
             <a:ext cx="1304737" cy="246221"/>
           </a:xfrm>
           <a:prstGeom prst="rect">
@@ -5268,8 +5271,8 @@
         </p:nvSpPr>
         <p:spPr>
           <a:xfrm>
-            <a:off x="733452" y="2613008"/>
-            <a:ext cx="1304737" cy="246221"/>
+            <a:off x="304800" y="2613008"/>
+            <a:ext cx="1733389" cy="246221"/>
           </a:xfrm>
           <a:prstGeom prst="rect">
             <a:avLst/>
@@ -5285,7 +5288,7 @@
             <a:pPr algn="r"/>
             <a:r>
               <a:rPr lang="de-DE" sz="1000" dirty="0"/>
-              <a:t>Motor PWM</a:t>
+              <a:t>Motor PWM Rückwärts</a:t>
             </a:r>
           </a:p>
         </p:txBody>
@@ -5790,10 +5793,700 @@
           </a:p>
         </p:txBody>
       </p:sp>
+      <p:sp>
+        <p:nvSpPr>
+          <p:cNvPr id="2" name="Pfeil: nach rechts 1">
+            <a:extLst>
+              <a:ext uri="{FF2B5EF4-FFF2-40B4-BE49-F238E27FC236}">
+                <a16:creationId xmlns:a16="http://schemas.microsoft.com/office/drawing/2014/main" id="{FFA9CBCC-0BCE-7553-1B25-382BB0828842}"/>
+              </a:ext>
+            </a:extLst>
+          </p:cNvPr>
+          <p:cNvSpPr/>
+          <p:nvPr/>
+        </p:nvSpPr>
+        <p:spPr>
+          <a:xfrm rot="10800000">
+            <a:off x="2038178" y="2560402"/>
+            <a:ext cx="1178188" cy="93812"/>
+          </a:xfrm>
+          <a:prstGeom prst="rightArrow">
+            <a:avLst>
+              <a:gd name="adj1" fmla="val 50000"/>
+              <a:gd name="adj2" fmla="val 144254"/>
+            </a:avLst>
+          </a:prstGeom>
+          <a:solidFill>
+            <a:srgbClr val="C00000"/>
+          </a:solidFill>
+        </p:spPr>
+        <p:style>
+          <a:lnRef idx="2">
+            <a:schemeClr val="accent1">
+              <a:shade val="15000"/>
+            </a:schemeClr>
+          </a:lnRef>
+          <a:fillRef idx="1">
+            <a:schemeClr val="accent1"/>
+          </a:fillRef>
+          <a:effectRef idx="0">
+            <a:schemeClr val="accent1"/>
+          </a:effectRef>
+          <a:fontRef idx="minor">
+            <a:schemeClr val="lt1"/>
+          </a:fontRef>
+        </p:style>
+        <p:txBody>
+          <a:bodyPr rtlCol="0" anchor="ctr"/>
+          <a:lstStyle/>
+          <a:p>
+            <a:pPr algn="ctr"/>
+            <a:endParaRPr lang="de-DE"/>
+          </a:p>
+        </p:txBody>
+      </p:sp>
+      <p:sp>
+        <p:nvSpPr>
+          <p:cNvPr id="3" name="Textfeld 2">
+            <a:extLst>
+              <a:ext uri="{FF2B5EF4-FFF2-40B4-BE49-F238E27FC236}">
+                <a16:creationId xmlns:a16="http://schemas.microsoft.com/office/drawing/2014/main" id="{1D80C021-CDD1-93D0-AB18-6B6EEF65A1B8}"/>
+              </a:ext>
+            </a:extLst>
+          </p:cNvPr>
+          <p:cNvSpPr txBox="1"/>
+          <p:nvPr/>
+        </p:nvSpPr>
+        <p:spPr>
+          <a:xfrm>
+            <a:off x="342086" y="2467184"/>
+            <a:ext cx="1696092" cy="246221"/>
+          </a:xfrm>
+          <a:prstGeom prst="rect">
+            <a:avLst/>
+          </a:prstGeom>
+          <a:noFill/>
+        </p:spPr>
+        <p:txBody>
+          <a:bodyPr wrap="square" rtlCol="0">
+            <a:spAutoFit/>
+          </a:bodyPr>
+          <a:lstStyle/>
+          <a:p>
+            <a:pPr algn="r"/>
+            <a:r>
+              <a:rPr lang="de-DE" sz="1000" dirty="0"/>
+              <a:t>Motor PWM Vorwärts</a:t>
+            </a:r>
+          </a:p>
+        </p:txBody>
+      </p:sp>
+      <p:sp>
+        <p:nvSpPr>
+          <p:cNvPr id="10" name="Pfeil: nach rechts 9">
+            <a:extLst>
+              <a:ext uri="{FF2B5EF4-FFF2-40B4-BE49-F238E27FC236}">
+                <a16:creationId xmlns:a16="http://schemas.microsoft.com/office/drawing/2014/main" id="{5A2B9C37-29FD-E60C-7F23-1875DD1ED81D}"/>
+              </a:ext>
+            </a:extLst>
+          </p:cNvPr>
+          <p:cNvSpPr/>
+          <p:nvPr/>
+        </p:nvSpPr>
+        <p:spPr>
+          <a:xfrm>
+            <a:off x="8670820" y="2561176"/>
+            <a:ext cx="1067255" cy="93611"/>
+          </a:xfrm>
+          <a:prstGeom prst="rightArrow">
+            <a:avLst>
+              <a:gd name="adj1" fmla="val 50000"/>
+              <a:gd name="adj2" fmla="val 144254"/>
+            </a:avLst>
+          </a:prstGeom>
+          <a:solidFill>
+            <a:srgbClr val="C00000"/>
+          </a:solidFill>
+        </p:spPr>
+        <p:style>
+          <a:lnRef idx="2">
+            <a:schemeClr val="accent1">
+              <a:shade val="15000"/>
+            </a:schemeClr>
+          </a:lnRef>
+          <a:fillRef idx="1">
+            <a:schemeClr val="accent1"/>
+          </a:fillRef>
+          <a:effectRef idx="0">
+            <a:schemeClr val="accent1"/>
+          </a:effectRef>
+          <a:fontRef idx="minor">
+            <a:schemeClr val="lt1"/>
+          </a:fontRef>
+        </p:style>
+        <p:txBody>
+          <a:bodyPr rtlCol="0" anchor="ctr"/>
+          <a:lstStyle/>
+          <a:p>
+            <a:pPr algn="ctr"/>
+            <a:endParaRPr lang="de-DE"/>
+          </a:p>
+        </p:txBody>
+      </p:sp>
+      <p:sp>
+        <p:nvSpPr>
+          <p:cNvPr id="15" name="Textfeld 14">
+            <a:extLst>
+              <a:ext uri="{FF2B5EF4-FFF2-40B4-BE49-F238E27FC236}">
+                <a16:creationId xmlns:a16="http://schemas.microsoft.com/office/drawing/2014/main" id="{38548253-BAAA-0168-05CB-B59C80B874AA}"/>
+              </a:ext>
+            </a:extLst>
+          </p:cNvPr>
+          <p:cNvSpPr txBox="1"/>
+          <p:nvPr/>
+        </p:nvSpPr>
+        <p:spPr>
+          <a:xfrm>
+            <a:off x="9738075" y="2489352"/>
+            <a:ext cx="1304737" cy="246221"/>
+          </a:xfrm>
+          <a:prstGeom prst="rect">
+            <a:avLst/>
+          </a:prstGeom>
+          <a:noFill/>
+        </p:spPr>
+        <p:txBody>
+          <a:bodyPr wrap="square" rtlCol="0">
+            <a:spAutoFit/>
+          </a:bodyPr>
+          <a:lstStyle/>
+          <a:p>
+            <a:r>
+              <a:rPr lang="de-DE" sz="1000" dirty="0"/>
+              <a:t>Bremslicht</a:t>
+            </a:r>
+          </a:p>
+        </p:txBody>
+      </p:sp>
+      <p:sp>
+        <p:nvSpPr>
+          <p:cNvPr id="17" name="Pfeil: nach rechts 16">
+            <a:extLst>
+              <a:ext uri="{FF2B5EF4-FFF2-40B4-BE49-F238E27FC236}">
+                <a16:creationId xmlns:a16="http://schemas.microsoft.com/office/drawing/2014/main" id="{3B6F0D05-4443-6616-E36E-3B8EB52F727A}"/>
+              </a:ext>
+            </a:extLst>
+          </p:cNvPr>
+          <p:cNvSpPr/>
+          <p:nvPr/>
+        </p:nvSpPr>
+        <p:spPr>
+          <a:xfrm>
+            <a:off x="8670820" y="3276599"/>
+            <a:ext cx="1067255" cy="93611"/>
+          </a:xfrm>
+          <a:prstGeom prst="rightArrow">
+            <a:avLst>
+              <a:gd name="adj1" fmla="val 50000"/>
+              <a:gd name="adj2" fmla="val 144254"/>
+            </a:avLst>
+          </a:prstGeom>
+          <a:solidFill>
+            <a:srgbClr val="C00000"/>
+          </a:solidFill>
+        </p:spPr>
+        <p:style>
+          <a:lnRef idx="2">
+            <a:schemeClr val="accent1">
+              <a:shade val="15000"/>
+            </a:schemeClr>
+          </a:lnRef>
+          <a:fillRef idx="1">
+            <a:schemeClr val="accent1"/>
+          </a:fillRef>
+          <a:effectRef idx="0">
+            <a:schemeClr val="accent1"/>
+          </a:effectRef>
+          <a:fontRef idx="minor">
+            <a:schemeClr val="lt1"/>
+          </a:fontRef>
+        </p:style>
+        <p:txBody>
+          <a:bodyPr rtlCol="0" anchor="ctr"/>
+          <a:lstStyle/>
+          <a:p>
+            <a:pPr algn="ctr"/>
+            <a:endParaRPr lang="de-DE"/>
+          </a:p>
+        </p:txBody>
+      </p:sp>
+      <p:sp>
+        <p:nvSpPr>
+          <p:cNvPr id="21" name="Textfeld 20">
+            <a:extLst>
+              <a:ext uri="{FF2B5EF4-FFF2-40B4-BE49-F238E27FC236}">
+                <a16:creationId xmlns:a16="http://schemas.microsoft.com/office/drawing/2014/main" id="{E80A23AA-2610-DB5E-B331-6ED304C98D51}"/>
+              </a:ext>
+            </a:extLst>
+          </p:cNvPr>
+          <p:cNvSpPr txBox="1"/>
+          <p:nvPr/>
+        </p:nvSpPr>
+        <p:spPr>
+          <a:xfrm>
+            <a:off x="9738075" y="3204675"/>
+            <a:ext cx="1304737" cy="246221"/>
+          </a:xfrm>
+          <a:prstGeom prst="rect">
+            <a:avLst/>
+          </a:prstGeom>
+          <a:noFill/>
+        </p:spPr>
+        <p:txBody>
+          <a:bodyPr wrap="square" rtlCol="0">
+            <a:spAutoFit/>
+          </a:bodyPr>
+          <a:lstStyle/>
+          <a:p>
+            <a:r>
+              <a:rPr lang="de-DE" sz="1000" dirty="0"/>
+              <a:t>Fernlicht</a:t>
+            </a:r>
+          </a:p>
+        </p:txBody>
+      </p:sp>
+      <p:sp>
+        <p:nvSpPr>
+          <p:cNvPr id="22" name="Pfeil: nach rechts 21">
+            <a:extLst>
+              <a:ext uri="{FF2B5EF4-FFF2-40B4-BE49-F238E27FC236}">
+                <a16:creationId xmlns:a16="http://schemas.microsoft.com/office/drawing/2014/main" id="{95852098-A595-9C09-5F29-9C22F8ACFB07}"/>
+              </a:ext>
+            </a:extLst>
+          </p:cNvPr>
+          <p:cNvSpPr/>
+          <p:nvPr/>
+        </p:nvSpPr>
+        <p:spPr>
+          <a:xfrm>
+            <a:off x="2038184" y="2436525"/>
+            <a:ext cx="1178188" cy="93812"/>
+          </a:xfrm>
+          <a:prstGeom prst="rightArrow">
+            <a:avLst>
+              <a:gd name="adj1" fmla="val 50000"/>
+              <a:gd name="adj2" fmla="val 144254"/>
+            </a:avLst>
+          </a:prstGeom>
+          <a:solidFill>
+            <a:srgbClr val="C00000"/>
+          </a:solidFill>
+        </p:spPr>
+        <p:style>
+          <a:lnRef idx="2">
+            <a:schemeClr val="accent1">
+              <a:shade val="15000"/>
+            </a:schemeClr>
+          </a:lnRef>
+          <a:fillRef idx="1">
+            <a:schemeClr val="accent1"/>
+          </a:fillRef>
+          <a:effectRef idx="0">
+            <a:schemeClr val="accent1"/>
+          </a:effectRef>
+          <a:fontRef idx="minor">
+            <a:schemeClr val="lt1"/>
+          </a:fontRef>
+        </p:style>
+        <p:txBody>
+          <a:bodyPr rtlCol="0" anchor="ctr"/>
+          <a:lstStyle/>
+          <a:p>
+            <a:pPr algn="ctr"/>
+            <a:endParaRPr lang="de-DE"/>
+          </a:p>
+        </p:txBody>
+      </p:sp>
+      <p:sp>
+        <p:nvSpPr>
+          <p:cNvPr id="23" name="Textfeld 22">
+            <a:extLst>
+              <a:ext uri="{FF2B5EF4-FFF2-40B4-BE49-F238E27FC236}">
+                <a16:creationId xmlns:a16="http://schemas.microsoft.com/office/drawing/2014/main" id="{A2F49543-EAFA-99A6-DE25-8F91169BB669}"/>
+              </a:ext>
+            </a:extLst>
+          </p:cNvPr>
+          <p:cNvSpPr txBox="1"/>
+          <p:nvPr/>
+        </p:nvSpPr>
+        <p:spPr>
+          <a:xfrm>
+            <a:off x="342092" y="2343307"/>
+            <a:ext cx="1696092" cy="246221"/>
+          </a:xfrm>
+          <a:prstGeom prst="rect">
+            <a:avLst/>
+          </a:prstGeom>
+          <a:noFill/>
+        </p:spPr>
+        <p:txBody>
+          <a:bodyPr wrap="square" rtlCol="0">
+            <a:spAutoFit/>
+          </a:bodyPr>
+          <a:lstStyle/>
+          <a:p>
+            <a:pPr algn="r"/>
+            <a:r>
+              <a:rPr lang="de-DE" sz="1000" dirty="0"/>
+              <a:t>Abstandssensor IN</a:t>
+            </a:r>
+          </a:p>
+        </p:txBody>
+      </p:sp>
+      <p:sp>
+        <p:nvSpPr>
+          <p:cNvPr id="25" name="Pfeil: nach rechts 24">
+            <a:extLst>
+              <a:ext uri="{FF2B5EF4-FFF2-40B4-BE49-F238E27FC236}">
+                <a16:creationId xmlns:a16="http://schemas.microsoft.com/office/drawing/2014/main" id="{A4AB60D9-AD1D-8732-FC30-C31774086277}"/>
+              </a:ext>
+            </a:extLst>
+          </p:cNvPr>
+          <p:cNvSpPr/>
+          <p:nvPr/>
+        </p:nvSpPr>
+        <p:spPr>
+          <a:xfrm>
+            <a:off x="2038178" y="2299918"/>
+            <a:ext cx="1178188" cy="93812"/>
+          </a:xfrm>
+          <a:prstGeom prst="rightArrow">
+            <a:avLst>
+              <a:gd name="adj1" fmla="val 50000"/>
+              <a:gd name="adj2" fmla="val 144254"/>
+            </a:avLst>
+          </a:prstGeom>
+          <a:solidFill>
+            <a:srgbClr val="C00000"/>
+          </a:solidFill>
+        </p:spPr>
+        <p:style>
+          <a:lnRef idx="2">
+            <a:schemeClr val="accent1">
+              <a:shade val="15000"/>
+            </a:schemeClr>
+          </a:lnRef>
+          <a:fillRef idx="1">
+            <a:schemeClr val="accent1"/>
+          </a:fillRef>
+          <a:effectRef idx="0">
+            <a:schemeClr val="accent1"/>
+          </a:effectRef>
+          <a:fontRef idx="minor">
+            <a:schemeClr val="lt1"/>
+          </a:fontRef>
+        </p:style>
+        <p:txBody>
+          <a:bodyPr rtlCol="0" anchor="ctr"/>
+          <a:lstStyle/>
+          <a:p>
+            <a:pPr algn="ctr"/>
+            <a:endParaRPr lang="de-DE"/>
+          </a:p>
+        </p:txBody>
+      </p:sp>
+      <p:sp>
+        <p:nvSpPr>
+          <p:cNvPr id="33" name="Textfeld 32">
+            <a:extLst>
+              <a:ext uri="{FF2B5EF4-FFF2-40B4-BE49-F238E27FC236}">
+                <a16:creationId xmlns:a16="http://schemas.microsoft.com/office/drawing/2014/main" id="{CD585E20-F688-800B-5E33-D34C520EB2A2}"/>
+              </a:ext>
+            </a:extLst>
+          </p:cNvPr>
+          <p:cNvSpPr txBox="1"/>
+          <p:nvPr/>
+        </p:nvSpPr>
+        <p:spPr>
+          <a:xfrm>
+            <a:off x="342086" y="2206700"/>
+            <a:ext cx="1696092" cy="246221"/>
+          </a:xfrm>
+          <a:prstGeom prst="rect">
+            <a:avLst/>
+          </a:prstGeom>
+          <a:noFill/>
+        </p:spPr>
+        <p:txBody>
+          <a:bodyPr wrap="square" rtlCol="0">
+            <a:spAutoFit/>
+          </a:bodyPr>
+          <a:lstStyle/>
+          <a:p>
+            <a:pPr algn="r"/>
+            <a:r>
+              <a:rPr lang="de-DE" sz="1000" dirty="0"/>
+              <a:t>Abstandssensor IN</a:t>
+            </a:r>
+          </a:p>
+        </p:txBody>
+      </p:sp>
     </p:spTree>
     <p:extLst>
       <p:ext uri="{BB962C8B-B14F-4D97-AF65-F5344CB8AC3E}">
         <p14:creationId xmlns:p14="http://schemas.microsoft.com/office/powerpoint/2010/main" val="3427562173"/>
+      </p:ext>
+    </p:extLst>
+  </p:cSld>
+  <p:clrMapOvr>
+    <a:masterClrMapping/>
+  </p:clrMapOvr>
+</p:sld>
+</file>
+
+<file path=ppt/slides/slide3.xml><?xml version="1.0" encoding="utf-8"?>
+<p:sld xmlns:a="http://schemas.openxmlformats.org/drawingml/2006/main" xmlns:r="http://schemas.openxmlformats.org/officeDocument/2006/relationships" xmlns:p="http://schemas.openxmlformats.org/presentationml/2006/main">
+  <p:cSld>
+    <p:spTree>
+      <p:nvGrpSpPr>
+        <p:cNvPr id="1" name=""/>
+        <p:cNvGrpSpPr/>
+        <p:nvPr/>
+      </p:nvGrpSpPr>
+      <p:grpSpPr>
+        <a:xfrm>
+          <a:off x="0" y="0"/>
+          <a:ext cx="0" cy="0"/>
+          <a:chOff x="0" y="0"/>
+          <a:chExt cx="0" cy="0"/>
+        </a:xfrm>
+      </p:grpSpPr>
+      <p:pic>
+        <p:nvPicPr>
+          <p:cNvPr id="5" name="Grafik 4" descr="Ein Bild, das Text, Diagramm, Plan, parallel enthält.&#10;&#10;KI-generierte Inhalte können fehlerhaft sein.">
+            <a:extLst>
+              <a:ext uri="{FF2B5EF4-FFF2-40B4-BE49-F238E27FC236}">
+                <a16:creationId xmlns:a16="http://schemas.microsoft.com/office/drawing/2014/main" id="{A4355AA1-8112-205F-0310-4BABC51C36E8}"/>
+              </a:ext>
+            </a:extLst>
+          </p:cNvPr>
+          <p:cNvPicPr>
+            <a:picLocks noChangeAspect="1"/>
+          </p:cNvPicPr>
+          <p:nvPr/>
+        </p:nvPicPr>
+        <p:blipFill>
+          <a:blip r:embed="rId2">
+            <a:extLst>
+              <a:ext uri="{28A0092B-C50C-407E-A947-70E740481C1C}">
+                <a14:useLocalDpi xmlns:a14="http://schemas.microsoft.com/office/drawing/2010/main" val="0"/>
+              </a:ext>
+            </a:extLst>
+          </a:blip>
+          <a:stretch>
+            <a:fillRect/>
+          </a:stretch>
+        </p:blipFill>
+        <p:spPr>
+          <a:xfrm>
+            <a:off x="1243580" y="274927"/>
+            <a:ext cx="9704839" cy="6308145"/>
+          </a:xfrm>
+          <a:prstGeom prst="rect">
+            <a:avLst/>
+          </a:prstGeom>
+        </p:spPr>
+      </p:pic>
+    </p:spTree>
+    <p:extLst>
+      <p:ext uri="{BB962C8B-B14F-4D97-AF65-F5344CB8AC3E}">
+        <p14:creationId xmlns:p14="http://schemas.microsoft.com/office/powerpoint/2010/main" val="316007611"/>
+      </p:ext>
+    </p:extLst>
+  </p:cSld>
+  <p:clrMapOvr>
+    <a:masterClrMapping/>
+  </p:clrMapOvr>
+</p:sld>
+</file>
+
+<file path=ppt/slides/slide4.xml><?xml version="1.0" encoding="utf-8"?>
+<p:sld xmlns:a="http://schemas.openxmlformats.org/drawingml/2006/main" xmlns:r="http://schemas.openxmlformats.org/officeDocument/2006/relationships" xmlns:p="http://schemas.openxmlformats.org/presentationml/2006/main">
+  <p:cSld>
+    <p:spTree>
+      <p:nvGrpSpPr>
+        <p:cNvPr id="1" name=""/>
+        <p:cNvGrpSpPr/>
+        <p:nvPr/>
+      </p:nvGrpSpPr>
+      <p:grpSpPr>
+        <a:xfrm>
+          <a:off x="0" y="0"/>
+          <a:ext cx="0" cy="0"/>
+          <a:chOff x="0" y="0"/>
+          <a:chExt cx="0" cy="0"/>
+        </a:xfrm>
+      </p:grpSpPr>
+      <p:pic>
+        <p:nvPicPr>
+          <p:cNvPr id="5" name="Grafik 4">
+            <a:extLst>
+              <a:ext uri="{FF2B5EF4-FFF2-40B4-BE49-F238E27FC236}">
+                <a16:creationId xmlns:a16="http://schemas.microsoft.com/office/drawing/2014/main" id="{9D9C7EAF-C095-0536-3E4D-C3F90FE3785C}"/>
+              </a:ext>
+            </a:extLst>
+          </p:cNvPr>
+          <p:cNvPicPr>
+            <a:picLocks noChangeAspect="1"/>
+          </p:cNvPicPr>
+          <p:nvPr/>
+        </p:nvPicPr>
+        <p:blipFill>
+          <a:blip r:embed="rId2"/>
+          <a:stretch>
+            <a:fillRect/>
+          </a:stretch>
+        </p:blipFill>
+        <p:spPr>
+          <a:xfrm>
+            <a:off x="3005398" y="779913"/>
+            <a:ext cx="6181204" cy="5298174"/>
+          </a:xfrm>
+          <a:prstGeom prst="rect">
+            <a:avLst/>
+          </a:prstGeom>
+        </p:spPr>
+      </p:pic>
+      <p:sp>
+        <p:nvSpPr>
+          <p:cNvPr id="6" name="Textfeld 5">
+            <a:extLst>
+              <a:ext uri="{FF2B5EF4-FFF2-40B4-BE49-F238E27FC236}">
+                <a16:creationId xmlns:a16="http://schemas.microsoft.com/office/drawing/2014/main" id="{63F50BAD-6CD3-D923-5913-C2D59085BDD5}"/>
+              </a:ext>
+            </a:extLst>
+          </p:cNvPr>
+          <p:cNvSpPr txBox="1"/>
+          <p:nvPr/>
+        </p:nvSpPr>
+        <p:spPr>
+          <a:xfrm>
+            <a:off x="3146173" y="323681"/>
+            <a:ext cx="5899653" cy="369332"/>
+          </a:xfrm>
+          <a:prstGeom prst="rect">
+            <a:avLst/>
+          </a:prstGeom>
+          <a:noFill/>
+        </p:spPr>
+        <p:txBody>
+          <a:bodyPr wrap="square" rtlCol="0">
+            <a:spAutoFit/>
+          </a:bodyPr>
+          <a:lstStyle/>
+          <a:p>
+            <a:pPr algn="ctr"/>
+            <a:r>
+              <a:rPr lang="de-DE" dirty="0"/>
+              <a:t>Schieberegister Layout</a:t>
+            </a:r>
+          </a:p>
+        </p:txBody>
+      </p:sp>
+    </p:spTree>
+    <p:extLst>
+      <p:ext uri="{BB962C8B-B14F-4D97-AF65-F5344CB8AC3E}">
+        <p14:creationId xmlns:p14="http://schemas.microsoft.com/office/powerpoint/2010/main" val="2719468127"/>
+      </p:ext>
+    </p:extLst>
+  </p:cSld>
+  <p:clrMapOvr>
+    <a:masterClrMapping/>
+  </p:clrMapOvr>
+</p:sld>
+</file>
+
+<file path=ppt/slides/slide5.xml><?xml version="1.0" encoding="utf-8"?>
+<p:sld xmlns:a="http://schemas.openxmlformats.org/drawingml/2006/main" xmlns:r="http://schemas.openxmlformats.org/officeDocument/2006/relationships" xmlns:p="http://schemas.openxmlformats.org/presentationml/2006/main">
+  <p:cSld>
+    <p:spTree>
+      <p:nvGrpSpPr>
+        <p:cNvPr id="1" name=""/>
+        <p:cNvGrpSpPr/>
+        <p:nvPr/>
+      </p:nvGrpSpPr>
+      <p:grpSpPr>
+        <a:xfrm>
+          <a:off x="0" y="0"/>
+          <a:ext cx="0" cy="0"/>
+          <a:chOff x="0" y="0"/>
+          <a:chExt cx="0" cy="0"/>
+        </a:xfrm>
+      </p:grpSpPr>
+      <p:sp>
+        <p:nvSpPr>
+          <p:cNvPr id="4" name="Textfeld 3">
+            <a:extLst>
+              <a:ext uri="{FF2B5EF4-FFF2-40B4-BE49-F238E27FC236}">
+                <a16:creationId xmlns:a16="http://schemas.microsoft.com/office/drawing/2014/main" id="{39EFBB93-42BD-AAAD-6F58-F9B407091760}"/>
+              </a:ext>
+            </a:extLst>
+          </p:cNvPr>
+          <p:cNvSpPr txBox="1"/>
+          <p:nvPr/>
+        </p:nvSpPr>
+        <p:spPr>
+          <a:xfrm>
+            <a:off x="898216" y="436970"/>
+            <a:ext cx="3948913" cy="1477328"/>
+          </a:xfrm>
+          <a:prstGeom prst="rect">
+            <a:avLst/>
+          </a:prstGeom>
+          <a:noFill/>
+        </p:spPr>
+        <p:txBody>
+          <a:bodyPr wrap="square" rtlCol="0">
+            <a:spAutoFit/>
+          </a:bodyPr>
+          <a:lstStyle/>
+          <a:p>
+            <a:r>
+              <a:rPr lang="de-DE" dirty="0" err="1"/>
+              <a:t>Int</a:t>
+            </a:r>
+            <a:r>
+              <a:rPr lang="de-DE" dirty="0"/>
+              <a:t> lichter</a:t>
+            </a:r>
+          </a:p>
+          <a:p>
+            <a:endParaRPr lang="de-DE" dirty="0"/>
+          </a:p>
+          <a:p>
+            <a:r>
+              <a:rPr lang="de-DE" dirty="0"/>
+              <a:t>Lichter == 1: Bremslicht</a:t>
+            </a:r>
+          </a:p>
+          <a:p>
+            <a:r>
+              <a:rPr lang="de-DE" dirty="0"/>
+              <a:t>Lichter == 2: Fernlicht</a:t>
+            </a:r>
+          </a:p>
+          <a:p>
+            <a:r>
+              <a:rPr lang="de-DE" dirty="0"/>
+              <a:t>Lichter ==  3: Bremslicht und Fernlicht</a:t>
+            </a:r>
+          </a:p>
+        </p:txBody>
+      </p:sp>
+    </p:spTree>
+    <p:extLst>
+      <p:ext uri="{BB962C8B-B14F-4D97-AF65-F5344CB8AC3E}">
+        <p14:creationId xmlns:p14="http://schemas.microsoft.com/office/powerpoint/2010/main" val="609454733"/>
       </p:ext>
     </p:extLst>
   </p:cSld>

</xml_diff>

<commit_message>
03.06 Stromcheck eingefügt, Motorpins Vorwärts/ Rückwärts
</commit_message>
<xml_diff>
--- a/SteurelogikPlan.pptx
+++ b/SteurelogikPlan.pptx
@@ -6138,7 +6138,7 @@
             <a:pPr algn="r"/>
             <a:r>
               <a:rPr lang="de-DE" sz="1000" dirty="0"/>
-              <a:t>Abstandssensor IN</a:t>
+              <a:t>Abstandssensor Echo IN</a:t>
             </a:r>
           </a:p>
         </p:txBody>
@@ -6156,7 +6156,7 @@
           <p:nvPr/>
         </p:nvSpPr>
         <p:spPr>
-          <a:xfrm>
+          <a:xfrm rot="10800000">
             <a:off x="2038178" y="2299918"/>
             <a:ext cx="1178188" cy="93812"/>
           </a:xfrm>
@@ -6209,8 +6209,8 @@
         </p:nvSpPr>
         <p:spPr>
           <a:xfrm>
-            <a:off x="342086" y="2206700"/>
-            <a:ext cx="1696092" cy="246221"/>
+            <a:off x="82550" y="2206700"/>
+            <a:ext cx="1955628" cy="246221"/>
           </a:xfrm>
           <a:prstGeom prst="rect">
             <a:avLst/>
@@ -6226,8 +6226,97 @@
             <a:pPr algn="r"/>
             <a:r>
               <a:rPr lang="de-DE" sz="1000" dirty="0"/>
-              <a:t>Abstandssensor IN</a:t>
-            </a:r>
+              <a:t>Abstandssensor Trigger OUT</a:t>
+            </a:r>
+          </a:p>
+        </p:txBody>
+      </p:sp>
+      <p:sp>
+        <p:nvSpPr>
+          <p:cNvPr id="6" name="Pfeil: nach rechts 5">
+            <a:extLst>
+              <a:ext uri="{FF2B5EF4-FFF2-40B4-BE49-F238E27FC236}">
+                <a16:creationId xmlns:a16="http://schemas.microsoft.com/office/drawing/2014/main" id="{4777871A-3575-9EA5-D76F-207F6FC3CE3E}"/>
+              </a:ext>
+            </a:extLst>
+          </p:cNvPr>
+          <p:cNvSpPr/>
+          <p:nvPr/>
+        </p:nvSpPr>
+        <p:spPr>
+          <a:xfrm rot="10800000">
+            <a:off x="2038184" y="3113470"/>
+            <a:ext cx="1178188" cy="93812"/>
+          </a:xfrm>
+          <a:prstGeom prst="rightArrow">
+            <a:avLst>
+              <a:gd name="adj1" fmla="val 50000"/>
+              <a:gd name="adj2" fmla="val 144254"/>
+            </a:avLst>
+          </a:prstGeom>
+          <a:solidFill>
+            <a:srgbClr val="C00000"/>
+          </a:solidFill>
+        </p:spPr>
+        <p:style>
+          <a:lnRef idx="2">
+            <a:schemeClr val="accent1">
+              <a:shade val="15000"/>
+            </a:schemeClr>
+          </a:lnRef>
+          <a:fillRef idx="1">
+            <a:schemeClr val="accent1"/>
+          </a:fillRef>
+          <a:effectRef idx="0">
+            <a:schemeClr val="accent1"/>
+          </a:effectRef>
+          <a:fontRef idx="minor">
+            <a:schemeClr val="lt1"/>
+          </a:fontRef>
+        </p:style>
+        <p:txBody>
+          <a:bodyPr rtlCol="0" anchor="ctr"/>
+          <a:lstStyle/>
+          <a:p>
+            <a:pPr algn="ctr"/>
+            <a:endParaRPr lang="de-DE"/>
+          </a:p>
+        </p:txBody>
+      </p:sp>
+      <p:sp>
+        <p:nvSpPr>
+          <p:cNvPr id="7" name="Textfeld 6">
+            <a:extLst>
+              <a:ext uri="{FF2B5EF4-FFF2-40B4-BE49-F238E27FC236}">
+                <a16:creationId xmlns:a16="http://schemas.microsoft.com/office/drawing/2014/main" id="{85232634-E0B6-F43C-DEF4-FE048F834F18}"/>
+              </a:ext>
+            </a:extLst>
+          </p:cNvPr>
+          <p:cNvSpPr txBox="1"/>
+          <p:nvPr/>
+        </p:nvSpPr>
+        <p:spPr>
+          <a:xfrm>
+            <a:off x="82556" y="3020252"/>
+            <a:ext cx="1955628" cy="246221"/>
+          </a:xfrm>
+          <a:prstGeom prst="rect">
+            <a:avLst/>
+          </a:prstGeom>
+          <a:noFill/>
+        </p:spPr>
+        <p:txBody>
+          <a:bodyPr wrap="square" rtlCol="0">
+            <a:spAutoFit/>
+          </a:bodyPr>
+          <a:lstStyle/>
+          <a:p>
+            <a:pPr algn="r"/>
+            <a:r>
+              <a:rPr lang="de-DE" sz="1000"/>
+              <a:t>Lautsprecher</a:t>
+            </a:r>
+            <a:endParaRPr lang="de-DE" sz="1000" dirty="0"/>
           </a:p>
         </p:txBody>
       </p:sp>

</xml_diff>

<commit_message>
Added StatusLEDs, Fernbedienung Code
</commit_message>
<xml_diff>
--- a/SteurelogikPlan.pptx
+++ b/SteurelogikPlan.pptx
@@ -263,7 +263,7 @@
           <a:p>
             <a:fld id="{4B66D619-850E-4CD6-9A5A-DAAD9E57CC37}" type="datetimeFigureOut">
               <a:rPr lang="de-DE" smtClean="0"/>
-              <a:t>27.05.2025</a:t>
+              <a:t>05.06.2025</a:t>
             </a:fld>
             <a:endParaRPr lang="de-DE"/>
           </a:p>
@@ -461,7 +461,7 @@
           <a:p>
             <a:fld id="{4B66D619-850E-4CD6-9A5A-DAAD9E57CC37}" type="datetimeFigureOut">
               <a:rPr lang="de-DE" smtClean="0"/>
-              <a:t>27.05.2025</a:t>
+              <a:t>05.06.2025</a:t>
             </a:fld>
             <a:endParaRPr lang="de-DE"/>
           </a:p>
@@ -669,7 +669,7 @@
           <a:p>
             <a:fld id="{4B66D619-850E-4CD6-9A5A-DAAD9E57CC37}" type="datetimeFigureOut">
               <a:rPr lang="de-DE" smtClean="0"/>
-              <a:t>27.05.2025</a:t>
+              <a:t>05.06.2025</a:t>
             </a:fld>
             <a:endParaRPr lang="de-DE"/>
           </a:p>
@@ -867,7 +867,7 @@
           <a:p>
             <a:fld id="{4B66D619-850E-4CD6-9A5A-DAAD9E57CC37}" type="datetimeFigureOut">
               <a:rPr lang="de-DE" smtClean="0"/>
-              <a:t>27.05.2025</a:t>
+              <a:t>05.06.2025</a:t>
             </a:fld>
             <a:endParaRPr lang="de-DE"/>
           </a:p>
@@ -1142,7 +1142,7 @@
           <a:p>
             <a:fld id="{4B66D619-850E-4CD6-9A5A-DAAD9E57CC37}" type="datetimeFigureOut">
               <a:rPr lang="de-DE" smtClean="0"/>
-              <a:t>27.05.2025</a:t>
+              <a:t>05.06.2025</a:t>
             </a:fld>
             <a:endParaRPr lang="de-DE"/>
           </a:p>
@@ -1407,7 +1407,7 @@
           <a:p>
             <a:fld id="{4B66D619-850E-4CD6-9A5A-DAAD9E57CC37}" type="datetimeFigureOut">
               <a:rPr lang="de-DE" smtClean="0"/>
-              <a:t>27.05.2025</a:t>
+              <a:t>05.06.2025</a:t>
             </a:fld>
             <a:endParaRPr lang="de-DE"/>
           </a:p>
@@ -1819,7 +1819,7 @@
           <a:p>
             <a:fld id="{4B66D619-850E-4CD6-9A5A-DAAD9E57CC37}" type="datetimeFigureOut">
               <a:rPr lang="de-DE" smtClean="0"/>
-              <a:t>27.05.2025</a:t>
+              <a:t>05.06.2025</a:t>
             </a:fld>
             <a:endParaRPr lang="de-DE"/>
           </a:p>
@@ -1960,7 +1960,7 @@
           <a:p>
             <a:fld id="{4B66D619-850E-4CD6-9A5A-DAAD9E57CC37}" type="datetimeFigureOut">
               <a:rPr lang="de-DE" smtClean="0"/>
-              <a:t>27.05.2025</a:t>
+              <a:t>05.06.2025</a:t>
             </a:fld>
             <a:endParaRPr lang="de-DE"/>
           </a:p>
@@ -2073,7 +2073,7 @@
           <a:p>
             <a:fld id="{4B66D619-850E-4CD6-9A5A-DAAD9E57CC37}" type="datetimeFigureOut">
               <a:rPr lang="de-DE" smtClean="0"/>
-              <a:t>27.05.2025</a:t>
+              <a:t>05.06.2025</a:t>
             </a:fld>
             <a:endParaRPr lang="de-DE"/>
           </a:p>
@@ -2384,7 +2384,7 @@
           <a:p>
             <a:fld id="{4B66D619-850E-4CD6-9A5A-DAAD9E57CC37}" type="datetimeFigureOut">
               <a:rPr lang="de-DE" smtClean="0"/>
-              <a:t>27.05.2025</a:t>
+              <a:t>05.06.2025</a:t>
             </a:fld>
             <a:endParaRPr lang="de-DE"/>
           </a:p>
@@ -2672,7 +2672,7 @@
           <a:p>
             <a:fld id="{4B66D619-850E-4CD6-9A5A-DAAD9E57CC37}" type="datetimeFigureOut">
               <a:rPr lang="de-DE" smtClean="0"/>
-              <a:t>27.05.2025</a:t>
+              <a:t>05.06.2025</a:t>
             </a:fld>
             <a:endParaRPr lang="de-DE"/>
           </a:p>
@@ -2913,7 +2913,7 @@
           <a:p>
             <a:fld id="{4B66D619-850E-4CD6-9A5A-DAAD9E57CC37}" type="datetimeFigureOut">
               <a:rPr lang="de-DE" smtClean="0"/>
-              <a:t>27.05.2025</a:t>
+              <a:t>05.06.2025</a:t>
             </a:fld>
             <a:endParaRPr lang="de-DE"/>
           </a:p>
@@ -5360,7 +5360,7 @@
             <a:pPr algn="r"/>
             <a:r>
               <a:rPr lang="de-DE" sz="1000" dirty="0"/>
-              <a:t>Blinker Links</a:t>
+              <a:t>Blinker Rechts</a:t>
             </a:r>
           </a:p>
         </p:txBody>
@@ -5439,7 +5439,7 @@
         </p:nvSpPr>
         <p:spPr>
           <a:xfrm>
-            <a:off x="-42704" y="3325141"/>
+            <a:off x="-104388" y="3724479"/>
             <a:ext cx="2080883" cy="261610"/>
           </a:xfrm>
           <a:prstGeom prst="rect">
@@ -5667,7 +5667,7 @@
         </p:nvSpPr>
         <p:spPr>
           <a:xfrm rot="10800000">
-            <a:off x="2038186" y="3419848"/>
+            <a:off x="1976502" y="3819186"/>
             <a:ext cx="1178188" cy="93812"/>
           </a:xfrm>
           <a:prstGeom prst="rightArrow">
@@ -5707,46 +5707,10 @@
       </p:sp>
       <p:sp>
         <p:nvSpPr>
-          <p:cNvPr id="31" name="Textfeld 30">
-            <a:extLst>
-              <a:ext uri="{FF2B5EF4-FFF2-40B4-BE49-F238E27FC236}">
-                <a16:creationId xmlns:a16="http://schemas.microsoft.com/office/drawing/2014/main" id="{60D34E82-83A6-AD61-397F-55630409453E}"/>
-              </a:ext>
-            </a:extLst>
-          </p:cNvPr>
-          <p:cNvSpPr txBox="1"/>
-          <p:nvPr/>
-        </p:nvSpPr>
-        <p:spPr>
-          <a:xfrm>
-            <a:off x="-42705" y="3719947"/>
-            <a:ext cx="2080883" cy="261610"/>
-          </a:xfrm>
-          <a:prstGeom prst="rect">
-            <a:avLst/>
-          </a:prstGeom>
-          <a:noFill/>
-        </p:spPr>
-        <p:txBody>
-          <a:bodyPr wrap="square" rtlCol="0">
-            <a:spAutoFit/>
-          </a:bodyPr>
-          <a:lstStyle/>
-          <a:p>
-            <a:pPr algn="r"/>
-            <a:r>
-              <a:rPr lang="de-DE" sz="1100" dirty="0"/>
-              <a:t>Schieberegister   LATCH</a:t>
-            </a:r>
-          </a:p>
-        </p:txBody>
-      </p:sp>
-      <p:sp>
-        <p:nvSpPr>
-          <p:cNvPr id="32" name="Pfeil: nach rechts 31">
-            <a:extLst>
-              <a:ext uri="{FF2B5EF4-FFF2-40B4-BE49-F238E27FC236}">
-                <a16:creationId xmlns:a16="http://schemas.microsoft.com/office/drawing/2014/main" id="{C00A54B0-1451-D71C-766C-B0D3A7970CCE}"/>
+          <p:cNvPr id="2" name="Pfeil: nach rechts 1">
+            <a:extLst>
+              <a:ext uri="{FF2B5EF4-FFF2-40B4-BE49-F238E27FC236}">
+                <a16:creationId xmlns:a16="http://schemas.microsoft.com/office/drawing/2014/main" id="{FFA9CBCC-0BCE-7553-1B25-382BB0828842}"/>
               </a:ext>
             </a:extLst>
           </p:cNvPr>
@@ -5755,7 +5719,7 @@
         </p:nvSpPr>
         <p:spPr>
           <a:xfrm rot="10800000">
-            <a:off x="2038186" y="3803846"/>
+            <a:off x="2038178" y="2560402"/>
             <a:ext cx="1178188" cy="93812"/>
           </a:xfrm>
           <a:prstGeom prst="rightArrow">
@@ -5795,10 +5759,46 @@
       </p:sp>
       <p:sp>
         <p:nvSpPr>
-          <p:cNvPr id="2" name="Pfeil: nach rechts 1">
-            <a:extLst>
-              <a:ext uri="{FF2B5EF4-FFF2-40B4-BE49-F238E27FC236}">
-                <a16:creationId xmlns:a16="http://schemas.microsoft.com/office/drawing/2014/main" id="{FFA9CBCC-0BCE-7553-1B25-382BB0828842}"/>
+          <p:cNvPr id="3" name="Textfeld 2">
+            <a:extLst>
+              <a:ext uri="{FF2B5EF4-FFF2-40B4-BE49-F238E27FC236}">
+                <a16:creationId xmlns:a16="http://schemas.microsoft.com/office/drawing/2014/main" id="{1D80C021-CDD1-93D0-AB18-6B6EEF65A1B8}"/>
+              </a:ext>
+            </a:extLst>
+          </p:cNvPr>
+          <p:cNvSpPr txBox="1"/>
+          <p:nvPr/>
+        </p:nvSpPr>
+        <p:spPr>
+          <a:xfrm>
+            <a:off x="342086" y="2467184"/>
+            <a:ext cx="1696092" cy="246221"/>
+          </a:xfrm>
+          <a:prstGeom prst="rect">
+            <a:avLst/>
+          </a:prstGeom>
+          <a:noFill/>
+        </p:spPr>
+        <p:txBody>
+          <a:bodyPr wrap="square" rtlCol="0">
+            <a:spAutoFit/>
+          </a:bodyPr>
+          <a:lstStyle/>
+          <a:p>
+            <a:pPr algn="r"/>
+            <a:r>
+              <a:rPr lang="de-DE" sz="1000" dirty="0"/>
+              <a:t>Motor PWM Vorwärts</a:t>
+            </a:r>
+          </a:p>
+        </p:txBody>
+      </p:sp>
+      <p:sp>
+        <p:nvSpPr>
+          <p:cNvPr id="10" name="Pfeil: nach rechts 9">
+            <a:extLst>
+              <a:ext uri="{FF2B5EF4-FFF2-40B4-BE49-F238E27FC236}">
+                <a16:creationId xmlns:a16="http://schemas.microsoft.com/office/drawing/2014/main" id="{5A2B9C37-29FD-E60C-7F23-1875DD1ED81D}"/>
               </a:ext>
             </a:extLst>
           </p:cNvPr>
@@ -5806,9 +5806,9 @@
           <p:nvPr/>
         </p:nvSpPr>
         <p:spPr>
-          <a:xfrm rot="10800000">
-            <a:off x="2038178" y="2560402"/>
-            <a:ext cx="1178188" cy="93812"/>
+          <a:xfrm>
+            <a:off x="8670820" y="2561176"/>
+            <a:ext cx="1067255" cy="93611"/>
           </a:xfrm>
           <a:prstGeom prst="rightArrow">
             <a:avLst>
@@ -5847,10 +5847,10 @@
       </p:sp>
       <p:sp>
         <p:nvSpPr>
-          <p:cNvPr id="3" name="Textfeld 2">
-            <a:extLst>
-              <a:ext uri="{FF2B5EF4-FFF2-40B4-BE49-F238E27FC236}">
-                <a16:creationId xmlns:a16="http://schemas.microsoft.com/office/drawing/2014/main" id="{1D80C021-CDD1-93D0-AB18-6B6EEF65A1B8}"/>
+          <p:cNvPr id="15" name="Textfeld 14">
+            <a:extLst>
+              <a:ext uri="{FF2B5EF4-FFF2-40B4-BE49-F238E27FC236}">
+                <a16:creationId xmlns:a16="http://schemas.microsoft.com/office/drawing/2014/main" id="{38548253-BAAA-0168-05CB-B59C80B874AA}"/>
               </a:ext>
             </a:extLst>
           </p:cNvPr>
@@ -5859,8 +5859,8 @@
         </p:nvSpPr>
         <p:spPr>
           <a:xfrm>
-            <a:off x="342086" y="2467184"/>
-            <a:ext cx="1696092" cy="246221"/>
+            <a:off x="9738075" y="2489352"/>
+            <a:ext cx="1304737" cy="246221"/>
           </a:xfrm>
           <a:prstGeom prst="rect">
             <a:avLst/>
@@ -5873,20 +5873,19 @@
           </a:bodyPr>
           <a:lstStyle/>
           <a:p>
-            <a:pPr algn="r"/>
             <a:r>
               <a:rPr lang="de-DE" sz="1000" dirty="0"/>
-              <a:t>Motor PWM Vorwärts</a:t>
-            </a:r>
-          </a:p>
-        </p:txBody>
-      </p:sp>
-      <p:sp>
-        <p:nvSpPr>
-          <p:cNvPr id="10" name="Pfeil: nach rechts 9">
-            <a:extLst>
-              <a:ext uri="{FF2B5EF4-FFF2-40B4-BE49-F238E27FC236}">
-                <a16:creationId xmlns:a16="http://schemas.microsoft.com/office/drawing/2014/main" id="{5A2B9C37-29FD-E60C-7F23-1875DD1ED81D}"/>
+              <a:t>Bremslicht</a:t>
+            </a:r>
+          </a:p>
+        </p:txBody>
+      </p:sp>
+      <p:sp>
+        <p:nvSpPr>
+          <p:cNvPr id="17" name="Pfeil: nach rechts 16">
+            <a:extLst>
+              <a:ext uri="{FF2B5EF4-FFF2-40B4-BE49-F238E27FC236}">
+                <a16:creationId xmlns:a16="http://schemas.microsoft.com/office/drawing/2014/main" id="{3B6F0D05-4443-6616-E36E-3B8EB52F727A}"/>
               </a:ext>
             </a:extLst>
           </p:cNvPr>
@@ -5895,7 +5894,7 @@
         </p:nvSpPr>
         <p:spPr>
           <a:xfrm>
-            <a:off x="8670820" y="2561176"/>
+            <a:off x="8670820" y="3276599"/>
             <a:ext cx="1067255" cy="93611"/>
           </a:xfrm>
           <a:prstGeom prst="rightArrow">
@@ -5935,10 +5934,10 @@
       </p:sp>
       <p:sp>
         <p:nvSpPr>
-          <p:cNvPr id="15" name="Textfeld 14">
-            <a:extLst>
-              <a:ext uri="{FF2B5EF4-FFF2-40B4-BE49-F238E27FC236}">
-                <a16:creationId xmlns:a16="http://schemas.microsoft.com/office/drawing/2014/main" id="{38548253-BAAA-0168-05CB-B59C80B874AA}"/>
+          <p:cNvPr id="21" name="Textfeld 20">
+            <a:extLst>
+              <a:ext uri="{FF2B5EF4-FFF2-40B4-BE49-F238E27FC236}">
+                <a16:creationId xmlns:a16="http://schemas.microsoft.com/office/drawing/2014/main" id="{E80A23AA-2610-DB5E-B331-6ED304C98D51}"/>
               </a:ext>
             </a:extLst>
           </p:cNvPr>
@@ -5947,7 +5946,7 @@
         </p:nvSpPr>
         <p:spPr>
           <a:xfrm>
-            <a:off x="9738075" y="2489352"/>
+            <a:off x="9738075" y="3204675"/>
             <a:ext cx="1304737" cy="246221"/>
           </a:xfrm>
           <a:prstGeom prst="rect">
@@ -5963,17 +5962,17 @@
           <a:p>
             <a:r>
               <a:rPr lang="de-DE" sz="1000" dirty="0"/>
-              <a:t>Bremslicht</a:t>
-            </a:r>
-          </a:p>
-        </p:txBody>
-      </p:sp>
-      <p:sp>
-        <p:nvSpPr>
-          <p:cNvPr id="17" name="Pfeil: nach rechts 16">
-            <a:extLst>
-              <a:ext uri="{FF2B5EF4-FFF2-40B4-BE49-F238E27FC236}">
-                <a16:creationId xmlns:a16="http://schemas.microsoft.com/office/drawing/2014/main" id="{3B6F0D05-4443-6616-E36E-3B8EB52F727A}"/>
+              <a:t>Fernlicht</a:t>
+            </a:r>
+          </a:p>
+        </p:txBody>
+      </p:sp>
+      <p:sp>
+        <p:nvSpPr>
+          <p:cNvPr id="22" name="Pfeil: nach rechts 21">
+            <a:extLst>
+              <a:ext uri="{FF2B5EF4-FFF2-40B4-BE49-F238E27FC236}">
+                <a16:creationId xmlns:a16="http://schemas.microsoft.com/office/drawing/2014/main" id="{95852098-A595-9C09-5F29-9C22F8ACFB07}"/>
               </a:ext>
             </a:extLst>
           </p:cNvPr>
@@ -5982,8 +5981,8 @@
         </p:nvSpPr>
         <p:spPr>
           <a:xfrm>
-            <a:off x="8670820" y="3276599"/>
-            <a:ext cx="1067255" cy="93611"/>
+            <a:off x="2038184" y="2436525"/>
+            <a:ext cx="1178188" cy="93812"/>
           </a:xfrm>
           <a:prstGeom prst="rightArrow">
             <a:avLst>
@@ -6022,10 +6021,10 @@
       </p:sp>
       <p:sp>
         <p:nvSpPr>
-          <p:cNvPr id="21" name="Textfeld 20">
-            <a:extLst>
-              <a:ext uri="{FF2B5EF4-FFF2-40B4-BE49-F238E27FC236}">
-                <a16:creationId xmlns:a16="http://schemas.microsoft.com/office/drawing/2014/main" id="{E80A23AA-2610-DB5E-B331-6ED304C98D51}"/>
+          <p:cNvPr id="23" name="Textfeld 22">
+            <a:extLst>
+              <a:ext uri="{FF2B5EF4-FFF2-40B4-BE49-F238E27FC236}">
+                <a16:creationId xmlns:a16="http://schemas.microsoft.com/office/drawing/2014/main" id="{A2F49543-EAFA-99A6-DE25-8F91169BB669}"/>
               </a:ext>
             </a:extLst>
           </p:cNvPr>
@@ -6034,8 +6033,8 @@
         </p:nvSpPr>
         <p:spPr>
           <a:xfrm>
-            <a:off x="9738075" y="3204675"/>
-            <a:ext cx="1304737" cy="246221"/>
+            <a:off x="342092" y="2343307"/>
+            <a:ext cx="1696092" cy="246221"/>
           </a:xfrm>
           <a:prstGeom prst="rect">
             <a:avLst/>
@@ -6048,19 +6047,20 @@
           </a:bodyPr>
           <a:lstStyle/>
           <a:p>
+            <a:pPr algn="r"/>
             <a:r>
               <a:rPr lang="de-DE" sz="1000" dirty="0"/>
-              <a:t>Fernlicht</a:t>
-            </a:r>
-          </a:p>
-        </p:txBody>
-      </p:sp>
-      <p:sp>
-        <p:nvSpPr>
-          <p:cNvPr id="22" name="Pfeil: nach rechts 21">
-            <a:extLst>
-              <a:ext uri="{FF2B5EF4-FFF2-40B4-BE49-F238E27FC236}">
-                <a16:creationId xmlns:a16="http://schemas.microsoft.com/office/drawing/2014/main" id="{95852098-A595-9C09-5F29-9C22F8ACFB07}"/>
+              <a:t>Abstandssensor Echo IN</a:t>
+            </a:r>
+          </a:p>
+        </p:txBody>
+      </p:sp>
+      <p:sp>
+        <p:nvSpPr>
+          <p:cNvPr id="6" name="Pfeil: nach rechts 5">
+            <a:extLst>
+              <a:ext uri="{FF2B5EF4-FFF2-40B4-BE49-F238E27FC236}">
+                <a16:creationId xmlns:a16="http://schemas.microsoft.com/office/drawing/2014/main" id="{4777871A-3575-9EA5-D76F-207F6FC3CE3E}"/>
               </a:ext>
             </a:extLst>
           </p:cNvPr>
@@ -6068,8 +6068,8 @@
           <p:nvPr/>
         </p:nvSpPr>
         <p:spPr>
-          <a:xfrm>
-            <a:off x="2038184" y="2436525"/>
+          <a:xfrm rot="10800000">
+            <a:off x="2038184" y="3113470"/>
             <a:ext cx="1178188" cy="93812"/>
           </a:xfrm>
           <a:prstGeom prst="rightArrow">
@@ -6109,10 +6109,10 @@
       </p:sp>
       <p:sp>
         <p:nvSpPr>
-          <p:cNvPr id="23" name="Textfeld 22">
-            <a:extLst>
-              <a:ext uri="{FF2B5EF4-FFF2-40B4-BE49-F238E27FC236}">
-                <a16:creationId xmlns:a16="http://schemas.microsoft.com/office/drawing/2014/main" id="{A2F49543-EAFA-99A6-DE25-8F91169BB669}"/>
+          <p:cNvPr id="7" name="Textfeld 6">
+            <a:extLst>
+              <a:ext uri="{FF2B5EF4-FFF2-40B4-BE49-F238E27FC236}">
+                <a16:creationId xmlns:a16="http://schemas.microsoft.com/office/drawing/2014/main" id="{85232634-E0B6-F43C-DEF4-FE048F834F18}"/>
               </a:ext>
             </a:extLst>
           </p:cNvPr>
@@ -6121,8 +6121,8 @@
         </p:nvSpPr>
         <p:spPr>
           <a:xfrm>
-            <a:off x="342092" y="2343307"/>
-            <a:ext cx="1696092" cy="246221"/>
+            <a:off x="82556" y="3020252"/>
+            <a:ext cx="1955628" cy="246221"/>
           </a:xfrm>
           <a:prstGeom prst="rect">
             <a:avLst/>
@@ -6138,17 +6138,53 @@
             <a:pPr algn="r"/>
             <a:r>
               <a:rPr lang="de-DE" sz="1000" dirty="0"/>
-              <a:t>Abstandssensor Echo IN</a:t>
-            </a:r>
-          </a:p>
-        </p:txBody>
-      </p:sp>
-      <p:sp>
-        <p:nvSpPr>
-          <p:cNvPr id="25" name="Pfeil: nach rechts 24">
-            <a:extLst>
-              <a:ext uri="{FF2B5EF4-FFF2-40B4-BE49-F238E27FC236}">
-                <a16:creationId xmlns:a16="http://schemas.microsoft.com/office/drawing/2014/main" id="{A4AB60D9-AD1D-8732-FC30-C31774086277}"/>
+              <a:t>Lautsprecher</a:t>
+            </a:r>
+          </a:p>
+        </p:txBody>
+      </p:sp>
+      <p:sp>
+        <p:nvSpPr>
+          <p:cNvPr id="34" name="Textfeld 33">
+            <a:extLst>
+              <a:ext uri="{FF2B5EF4-FFF2-40B4-BE49-F238E27FC236}">
+                <a16:creationId xmlns:a16="http://schemas.microsoft.com/office/drawing/2014/main" id="{CD585E20-F688-800B-5E33-D34C520EB2A2}"/>
+              </a:ext>
+            </a:extLst>
+          </p:cNvPr>
+          <p:cNvSpPr txBox="1"/>
+          <p:nvPr/>
+        </p:nvSpPr>
+        <p:spPr>
+          <a:xfrm>
+            <a:off x="9502921" y="2931137"/>
+            <a:ext cx="1955628" cy="246221"/>
+          </a:xfrm>
+          <a:prstGeom prst="rect">
+            <a:avLst/>
+          </a:prstGeom>
+          <a:noFill/>
+        </p:spPr>
+        <p:txBody>
+          <a:bodyPr wrap="square" rtlCol="0">
+            <a:spAutoFit/>
+          </a:bodyPr>
+          <a:lstStyle/>
+          <a:p>
+            <a:pPr algn="r"/>
+            <a:r>
+              <a:rPr lang="de-DE" sz="1000" dirty="0"/>
+              <a:t>Abstandssensor Trigger OUT</a:t>
+            </a:r>
+          </a:p>
+        </p:txBody>
+      </p:sp>
+      <p:sp>
+        <p:nvSpPr>
+          <p:cNvPr id="35" name="Pfeil: nach rechts 34">
+            <a:extLst>
+              <a:ext uri="{FF2B5EF4-FFF2-40B4-BE49-F238E27FC236}">
+                <a16:creationId xmlns:a16="http://schemas.microsoft.com/office/drawing/2014/main" id="{D001C7D4-04CE-16AC-5E86-E1D46F6BE6E6}"/>
               </a:ext>
             </a:extLst>
           </p:cNvPr>
@@ -6156,9 +6192,9 @@
           <p:nvPr/>
         </p:nvSpPr>
         <p:spPr>
-          <a:xfrm rot="10800000">
-            <a:off x="2038178" y="2299918"/>
-            <a:ext cx="1178188" cy="93812"/>
+          <a:xfrm>
+            <a:off x="8670820" y="3023770"/>
+            <a:ext cx="1067255" cy="93611"/>
           </a:xfrm>
           <a:prstGeom prst="rightArrow">
             <a:avLst>
@@ -6197,46 +6233,10 @@
       </p:sp>
       <p:sp>
         <p:nvSpPr>
-          <p:cNvPr id="33" name="Textfeld 32">
-            <a:extLst>
-              <a:ext uri="{FF2B5EF4-FFF2-40B4-BE49-F238E27FC236}">
-                <a16:creationId xmlns:a16="http://schemas.microsoft.com/office/drawing/2014/main" id="{CD585E20-F688-800B-5E33-D34C520EB2A2}"/>
-              </a:ext>
-            </a:extLst>
-          </p:cNvPr>
-          <p:cNvSpPr txBox="1"/>
-          <p:nvPr/>
-        </p:nvSpPr>
-        <p:spPr>
-          <a:xfrm>
-            <a:off x="82550" y="2206700"/>
-            <a:ext cx="1955628" cy="246221"/>
-          </a:xfrm>
-          <a:prstGeom prst="rect">
-            <a:avLst/>
-          </a:prstGeom>
-          <a:noFill/>
-        </p:spPr>
-        <p:txBody>
-          <a:bodyPr wrap="square" rtlCol="0">
-            <a:spAutoFit/>
-          </a:bodyPr>
-          <a:lstStyle/>
-          <a:p>
-            <a:pPr algn="r"/>
-            <a:r>
-              <a:rPr lang="de-DE" sz="1000" dirty="0"/>
-              <a:t>Abstandssensor Trigger OUT</a:t>
-            </a:r>
-          </a:p>
-        </p:txBody>
-      </p:sp>
-      <p:sp>
-        <p:nvSpPr>
-          <p:cNvPr id="6" name="Pfeil: nach rechts 5">
-            <a:extLst>
-              <a:ext uri="{FF2B5EF4-FFF2-40B4-BE49-F238E27FC236}">
-                <a16:creationId xmlns:a16="http://schemas.microsoft.com/office/drawing/2014/main" id="{4777871A-3575-9EA5-D76F-207F6FC3CE3E}"/>
+          <p:cNvPr id="36" name="Pfeil: nach rechts 35">
+            <a:extLst>
+              <a:ext uri="{FF2B5EF4-FFF2-40B4-BE49-F238E27FC236}">
+                <a16:creationId xmlns:a16="http://schemas.microsoft.com/office/drawing/2014/main" id="{BB838320-E93F-459F-E2A8-FB76508CBE07}"/>
               </a:ext>
             </a:extLst>
           </p:cNvPr>
@@ -6244,8 +6244,8 @@
           <p:nvPr/>
         </p:nvSpPr>
         <p:spPr>
-          <a:xfrm rot="10800000">
-            <a:off x="2038184" y="3113470"/>
+          <a:xfrm>
+            <a:off x="2038178" y="2308566"/>
             <a:ext cx="1178188" cy="93812"/>
           </a:xfrm>
           <a:prstGeom prst="rightArrow">
@@ -6285,10 +6285,10 @@
       </p:sp>
       <p:sp>
         <p:nvSpPr>
-          <p:cNvPr id="7" name="Textfeld 6">
-            <a:extLst>
-              <a:ext uri="{FF2B5EF4-FFF2-40B4-BE49-F238E27FC236}">
-                <a16:creationId xmlns:a16="http://schemas.microsoft.com/office/drawing/2014/main" id="{85232634-E0B6-F43C-DEF4-FE048F834F18}"/>
+          <p:cNvPr id="38" name="Textfeld 37">
+            <a:extLst>
+              <a:ext uri="{FF2B5EF4-FFF2-40B4-BE49-F238E27FC236}">
+                <a16:creationId xmlns:a16="http://schemas.microsoft.com/office/drawing/2014/main" id="{89A5D2A7-0224-8210-B01B-6ECFAD1AC3EB}"/>
               </a:ext>
             </a:extLst>
           </p:cNvPr>
@@ -6297,8 +6297,8 @@
         </p:nvSpPr>
         <p:spPr>
           <a:xfrm>
-            <a:off x="82556" y="3020252"/>
-            <a:ext cx="1955628" cy="246221"/>
+            <a:off x="342074" y="2233669"/>
+            <a:ext cx="1696092" cy="246221"/>
           </a:xfrm>
           <a:prstGeom prst="rect">
             <a:avLst/>
@@ -6313,10 +6313,96 @@
           <a:p>
             <a:pPr algn="r"/>
             <a:r>
-              <a:rPr lang="de-DE" sz="1000"/>
-              <a:t>Lautsprecher</a:t>
-            </a:r>
-            <a:endParaRPr lang="de-DE" sz="1000" dirty="0"/>
+              <a:rPr lang="de-DE" sz="1000" dirty="0"/>
+              <a:t>Sebastian IN</a:t>
+            </a:r>
+          </a:p>
+        </p:txBody>
+      </p:sp>
+      <p:sp>
+        <p:nvSpPr>
+          <p:cNvPr id="8" name="Pfeil: nach rechts 7">
+            <a:extLst>
+              <a:ext uri="{FF2B5EF4-FFF2-40B4-BE49-F238E27FC236}">
+                <a16:creationId xmlns:a16="http://schemas.microsoft.com/office/drawing/2014/main" id="{A41D3961-F9C1-0853-F7DF-8701D2B70D80}"/>
+              </a:ext>
+            </a:extLst>
+          </p:cNvPr>
+          <p:cNvSpPr/>
+          <p:nvPr/>
+        </p:nvSpPr>
+        <p:spPr>
+          <a:xfrm>
+            <a:off x="8670820" y="3155671"/>
+            <a:ext cx="1067255" cy="93611"/>
+          </a:xfrm>
+          <a:prstGeom prst="rightArrow">
+            <a:avLst>
+              <a:gd name="adj1" fmla="val 50000"/>
+              <a:gd name="adj2" fmla="val 144254"/>
+            </a:avLst>
+          </a:prstGeom>
+          <a:solidFill>
+            <a:srgbClr val="C00000"/>
+          </a:solidFill>
+        </p:spPr>
+        <p:style>
+          <a:lnRef idx="2">
+            <a:schemeClr val="accent1">
+              <a:shade val="15000"/>
+            </a:schemeClr>
+          </a:lnRef>
+          <a:fillRef idx="1">
+            <a:schemeClr val="accent1"/>
+          </a:fillRef>
+          <a:effectRef idx="0">
+            <a:schemeClr val="accent1"/>
+          </a:effectRef>
+          <a:fontRef idx="minor">
+            <a:schemeClr val="lt1"/>
+          </a:fontRef>
+        </p:style>
+        <p:txBody>
+          <a:bodyPr rtlCol="0" anchor="ctr"/>
+          <a:lstStyle/>
+          <a:p>
+            <a:pPr algn="ctr"/>
+            <a:endParaRPr lang="de-DE"/>
+          </a:p>
+        </p:txBody>
+      </p:sp>
+      <p:sp>
+        <p:nvSpPr>
+          <p:cNvPr id="25" name="Textfeld 24">
+            <a:extLst>
+              <a:ext uri="{FF2B5EF4-FFF2-40B4-BE49-F238E27FC236}">
+                <a16:creationId xmlns:a16="http://schemas.microsoft.com/office/drawing/2014/main" id="{D44623CF-80DF-1945-22FE-7681006C2FDB}"/>
+              </a:ext>
+            </a:extLst>
+          </p:cNvPr>
+          <p:cNvSpPr txBox="1"/>
+          <p:nvPr/>
+        </p:nvSpPr>
+        <p:spPr>
+          <a:xfrm>
+            <a:off x="9738075" y="3083747"/>
+            <a:ext cx="1925882" cy="246221"/>
+          </a:xfrm>
+          <a:prstGeom prst="rect">
+            <a:avLst/>
+          </a:prstGeom>
+          <a:noFill/>
+        </p:spPr>
+        <p:txBody>
+          <a:bodyPr wrap="square" rtlCol="0">
+            <a:spAutoFit/>
+          </a:bodyPr>
+          <a:lstStyle/>
+          <a:p>
+            <a:r>
+              <a:rPr lang="de-DE" sz="1000" dirty="0"/>
+              <a:t>Schieberegister LATCH</a:t>
+            </a:r>
           </a:p>
         </p:txBody>
       </p:sp>

</xml_diff>